<commit_message>
minor fix to chart
</commit_message>
<xml_diff>
--- a/2023-rit-visit/images/figs.pptx
+++ b/2023-rit-visit/images/figs.pptx
@@ -5961,6 +5961,35 @@
           <a:xfrm>
             <a:off x="602724" y="5870600"/>
             <a:ext cx="5390119" cy="590040"/>
+          </a:xfrm>
+          <a:prstGeom prst="rect">
+            <a:avLst/>
+          </a:prstGeom>
+        </p:spPr>
+      </p:pic>
+      <p:pic>
+        <p:nvPicPr>
+          <p:cNvPr id="2" name="Picture 1">
+            <a:extLst>
+              <a:ext uri="{FF2B5EF4-FFF2-40B4-BE49-F238E27FC236}">
+                <a16:creationId xmlns:a16="http://schemas.microsoft.com/office/drawing/2014/main" id="{2E431B33-B016-6F74-77A9-F28CBB02BB8E}"/>
+              </a:ext>
+            </a:extLst>
+          </p:cNvPr>
+          <p:cNvPicPr>
+            <a:picLocks noChangeAspect="1"/>
+          </p:cNvPicPr>
+          <p:nvPr/>
+        </p:nvPicPr>
+        <p:blipFill rotWithShape="1">
+          <a:blip r:embed="rId3"/>
+          <a:srcRect t="92284" b="3649"/>
+          <a:stretch/>
+        </p:blipFill>
+        <p:spPr>
+          <a:xfrm>
+            <a:off x="-489851" y="5130385"/>
+            <a:ext cx="6379027" cy="407652"/>
           </a:xfrm>
           <a:prstGeom prst="rect">
             <a:avLst/>

</xml_diff>